<commit_message>
Report & Powerpoint Finished
</commit_message>
<xml_diff>
--- a/s5132841_Algorithm_Assignment_2.pptx
+++ b/s5132841_Algorithm_Assignment_2.pptx
@@ -287,7 +287,7 @@
           <a:p>
             <a:fld id="{5ED388EF-EC02-44D6-9307-8B22B3FA30B5}" type="datetimeFigureOut">
               <a:rPr lang="en-AU" smtClean="0"/>
-              <a:t>11/05/2019</a:t>
+              <a:t>12/05/2019</a:t>
             </a:fld>
             <a:endParaRPr lang="en-AU"/>
           </a:p>
@@ -487,7 +487,7 @@
           <a:p>
             <a:fld id="{5ED388EF-EC02-44D6-9307-8B22B3FA30B5}" type="datetimeFigureOut">
               <a:rPr lang="en-AU" smtClean="0"/>
-              <a:t>11/05/2019</a:t>
+              <a:t>12/05/2019</a:t>
             </a:fld>
             <a:endParaRPr lang="en-AU"/>
           </a:p>
@@ -697,7 +697,7 @@
           <a:p>
             <a:fld id="{5ED388EF-EC02-44D6-9307-8B22B3FA30B5}" type="datetimeFigureOut">
               <a:rPr lang="en-AU" smtClean="0"/>
-              <a:t>11/05/2019</a:t>
+              <a:t>12/05/2019</a:t>
             </a:fld>
             <a:endParaRPr lang="en-AU"/>
           </a:p>
@@ -897,7 +897,7 @@
           <a:p>
             <a:fld id="{5ED388EF-EC02-44D6-9307-8B22B3FA30B5}" type="datetimeFigureOut">
               <a:rPr lang="en-AU" smtClean="0"/>
-              <a:t>11/05/2019</a:t>
+              <a:t>12/05/2019</a:t>
             </a:fld>
             <a:endParaRPr lang="en-AU"/>
           </a:p>
@@ -1173,7 +1173,7 @@
           <a:p>
             <a:fld id="{5ED388EF-EC02-44D6-9307-8B22B3FA30B5}" type="datetimeFigureOut">
               <a:rPr lang="en-AU" smtClean="0"/>
-              <a:t>11/05/2019</a:t>
+              <a:t>12/05/2019</a:t>
             </a:fld>
             <a:endParaRPr lang="en-AU"/>
           </a:p>
@@ -1441,7 +1441,7 @@
           <a:p>
             <a:fld id="{5ED388EF-EC02-44D6-9307-8B22B3FA30B5}" type="datetimeFigureOut">
               <a:rPr lang="en-AU" smtClean="0"/>
-              <a:t>11/05/2019</a:t>
+              <a:t>12/05/2019</a:t>
             </a:fld>
             <a:endParaRPr lang="en-AU"/>
           </a:p>
@@ -1856,7 +1856,7 @@
           <a:p>
             <a:fld id="{5ED388EF-EC02-44D6-9307-8B22B3FA30B5}" type="datetimeFigureOut">
               <a:rPr lang="en-AU" smtClean="0"/>
-              <a:t>11/05/2019</a:t>
+              <a:t>12/05/2019</a:t>
             </a:fld>
             <a:endParaRPr lang="en-AU"/>
           </a:p>
@@ -1998,7 +1998,7 @@
           <a:p>
             <a:fld id="{5ED388EF-EC02-44D6-9307-8B22B3FA30B5}" type="datetimeFigureOut">
               <a:rPr lang="en-AU" smtClean="0"/>
-              <a:t>11/05/2019</a:t>
+              <a:t>12/05/2019</a:t>
             </a:fld>
             <a:endParaRPr lang="en-AU"/>
           </a:p>
@@ -2111,7 +2111,7 @@
           <a:p>
             <a:fld id="{5ED388EF-EC02-44D6-9307-8B22B3FA30B5}" type="datetimeFigureOut">
               <a:rPr lang="en-AU" smtClean="0"/>
-              <a:t>11/05/2019</a:t>
+              <a:t>12/05/2019</a:t>
             </a:fld>
             <a:endParaRPr lang="en-AU"/>
           </a:p>
@@ -2424,7 +2424,7 @@
           <a:p>
             <a:fld id="{5ED388EF-EC02-44D6-9307-8B22B3FA30B5}" type="datetimeFigureOut">
               <a:rPr lang="en-AU" smtClean="0"/>
-              <a:t>11/05/2019</a:t>
+              <a:t>12/05/2019</a:t>
             </a:fld>
             <a:endParaRPr lang="en-AU"/>
           </a:p>
@@ -2713,7 +2713,7 @@
           <a:p>
             <a:fld id="{5ED388EF-EC02-44D6-9307-8B22B3FA30B5}" type="datetimeFigureOut">
               <a:rPr lang="en-AU" smtClean="0"/>
-              <a:t>11/05/2019</a:t>
+              <a:t>12/05/2019</a:t>
             </a:fld>
             <a:endParaRPr lang="en-AU"/>
           </a:p>
@@ -2959,7 +2959,7 @@
           <a:p>
             <a:fld id="{5ED388EF-EC02-44D6-9307-8B22B3FA30B5}" type="datetimeFigureOut">
               <a:rPr lang="en-AU" smtClean="0"/>
-              <a:t>11/05/2019</a:t>
+              <a:t>12/05/2019</a:t>
             </a:fld>
             <a:endParaRPr lang="en-AU"/>
           </a:p>
@@ -6507,8 +6507,8 @@
         </p:nvSpPr>
         <p:spPr>
           <a:xfrm>
-            <a:off x="262466" y="1462818"/>
-            <a:ext cx="5039108" cy="646331"/>
+            <a:off x="263143" y="1336156"/>
+            <a:ext cx="6628724" cy="1200329"/>
           </a:xfrm>
           <a:prstGeom prst="rect">
             <a:avLst/>
@@ -6527,7 +6527,126 @@
             </a:pPr>
             <a:r>
               <a:rPr lang="en-AU" sz="3600" dirty="0"/>
-              <a:t>[To be added]</a:t>
+              <a:t>Had a time complexity of </a:t>
+            </a:r>
+            <a:r>
+              <a:rPr lang="en-AU" sz="3600" b="1" dirty="0"/>
+              <a:t>O(nlog</a:t>
+            </a:r>
+            <a:r>
+              <a:rPr lang="en-AU" sz="3600" b="1" baseline="-25000" dirty="0"/>
+              <a:t>2</a:t>
+            </a:r>
+            <a:r>
+              <a:rPr lang="en-AU" sz="3600" b="1" dirty="0"/>
+              <a:t>n)</a:t>
+            </a:r>
+          </a:p>
+        </p:txBody>
+      </p:sp>
+      <p:sp>
+        <p:nvSpPr>
+          <p:cNvPr id="5" name="TextBox 4">
+            <a:extLst>
+              <a:ext uri="{FF2B5EF4-FFF2-40B4-BE49-F238E27FC236}">
+                <a16:creationId xmlns:a16="http://schemas.microsoft.com/office/drawing/2014/main" id="{5C3969B3-BEF8-405C-8EEB-D8E84250FA26}"/>
+              </a:ext>
+            </a:extLst>
+          </p:cNvPr>
+          <p:cNvSpPr txBox="1"/>
+          <p:nvPr/>
+        </p:nvSpPr>
+        <p:spPr>
+          <a:xfrm>
+            <a:off x="263143" y="2890355"/>
+            <a:ext cx="9635068" cy="2862322"/>
+          </a:xfrm>
+          <a:prstGeom prst="rect">
+            <a:avLst/>
+          </a:prstGeom>
+          <a:noFill/>
+        </p:spPr>
+        <p:txBody>
+          <a:bodyPr wrap="square" rtlCol="0">
+            <a:spAutoFit/>
+          </a:bodyPr>
+          <a:lstStyle/>
+          <a:p>
+            <a:r>
+              <a:rPr lang="en-AU" sz="3600" dirty="0"/>
+              <a:t>Proof:</a:t>
+            </a:r>
+          </a:p>
+          <a:p>
+            <a:r>
+              <a:rPr lang="en-AU" sz="3600" dirty="0"/>
+              <a:t>T(n) = nlog</a:t>
+            </a:r>
+            <a:r>
+              <a:rPr lang="en-AU" sz="3600" baseline="-25000" dirty="0"/>
+              <a:t>2</a:t>
+            </a:r>
+            <a:r>
+              <a:rPr lang="en-AU" sz="3600" dirty="0"/>
+              <a:t>n + nlog</a:t>
+            </a:r>
+            <a:r>
+              <a:rPr lang="en-AU" sz="3600" baseline="-25000" dirty="0"/>
+              <a:t>2</a:t>
+            </a:r>
+            <a:r>
+              <a:rPr lang="en-AU" sz="3600" dirty="0"/>
+              <a:t>n + nlog</a:t>
+            </a:r>
+            <a:r>
+              <a:rPr lang="en-AU" sz="3600" baseline="-25000" dirty="0"/>
+              <a:t>2</a:t>
+            </a:r>
+            <a:r>
+              <a:rPr lang="en-AU" sz="3600" dirty="0"/>
+              <a:t>n + 1</a:t>
+            </a:r>
+          </a:p>
+          <a:p>
+            <a:r>
+              <a:rPr lang="en-AU" sz="3600" dirty="0"/>
+              <a:t>= 3nlog</a:t>
+            </a:r>
+            <a:r>
+              <a:rPr lang="en-AU" sz="3600" baseline="-25000" dirty="0"/>
+              <a:t>2</a:t>
+            </a:r>
+            <a:r>
+              <a:rPr lang="en-AU" sz="3600" dirty="0"/>
+              <a:t>n + 1</a:t>
+            </a:r>
+          </a:p>
+          <a:p>
+            <a:r>
+              <a:rPr lang="en-AU" sz="3600" dirty="0"/>
+              <a:t>≤ C ⋅ nlog</a:t>
+            </a:r>
+            <a:r>
+              <a:rPr lang="en-AU" sz="3600" baseline="-25000" dirty="0"/>
+              <a:t>2</a:t>
+            </a:r>
+            <a:r>
+              <a:rPr lang="en-AU" sz="3600" dirty="0"/>
+              <a:t>n</a:t>
+            </a:r>
+          </a:p>
+          <a:p>
+            <a:r>
+              <a:rPr lang="en-AU" sz="3600" dirty="0"/>
+              <a:t>∴O(nlog</a:t>
+            </a:r>
+            <a:r>
+              <a:rPr lang="en-AU" sz="3600" baseline="-25000" dirty="0"/>
+              <a:t>2</a:t>
+            </a:r>
+            <a:r>
+              <a:rPr lang="en-AU" sz="3600" dirty="0"/>
+              <a:t>n)</a:t>
             </a:r>
           </a:p>
         </p:txBody>
@@ -6638,8 +6757,8 @@
         </p:nvSpPr>
         <p:spPr>
           <a:xfrm>
-            <a:off x="262466" y="1462818"/>
-            <a:ext cx="5039108" cy="646331"/>
+            <a:off x="262466" y="1301235"/>
+            <a:ext cx="7662334" cy="646331"/>
           </a:xfrm>
           <a:prstGeom prst="rect">
             <a:avLst/>
@@ -6657,9 +6776,87 @@
               <a:buChar char="•"/>
             </a:pPr>
             <a:r>
+              <a:rPr lang="en-AU" sz="3600" b="1" dirty="0"/>
+              <a:t>Yes</a:t>
+            </a:r>
+            <a:r>
               <a:rPr lang="en-AU" sz="3600" dirty="0"/>
-              <a:t>[To be added]</a:t>
-            </a:r>
+              <a:t>, the algorithm behaves correctly.</a:t>
+            </a:r>
+          </a:p>
+        </p:txBody>
+      </p:sp>
+      <p:sp>
+        <p:nvSpPr>
+          <p:cNvPr id="5" name="TextBox 4">
+            <a:extLst>
+              <a:ext uri="{FF2B5EF4-FFF2-40B4-BE49-F238E27FC236}">
+                <a16:creationId xmlns:a16="http://schemas.microsoft.com/office/drawing/2014/main" id="{427538B8-F9AF-4162-A6A9-0708F55CAF19}"/>
+              </a:ext>
+            </a:extLst>
+          </p:cNvPr>
+          <p:cNvSpPr txBox="1"/>
+          <p:nvPr/>
+        </p:nvSpPr>
+        <p:spPr>
+          <a:xfrm>
+            <a:off x="262466" y="2076712"/>
+            <a:ext cx="11472334" cy="5139869"/>
+          </a:xfrm>
+          <a:prstGeom prst="rect">
+            <a:avLst/>
+          </a:prstGeom>
+          <a:noFill/>
+        </p:spPr>
+        <p:txBody>
+          <a:bodyPr wrap="square" rtlCol="0">
+            <a:spAutoFit/>
+          </a:bodyPr>
+          <a:lstStyle/>
+          <a:p>
+            <a:r>
+              <a:rPr lang="en-AU" sz="3200" dirty="0"/>
+              <a:t>Proof by contradiction:</a:t>
+            </a:r>
+          </a:p>
+          <a:p>
+            <a:pPr marL="742950" indent="-742950">
+              <a:buAutoNum type="arabicPeriod"/>
+            </a:pPr>
+            <a:r>
+              <a:rPr lang="en-AU" sz="3200" dirty="0"/>
+              <a:t>Assume the same ball can be picked by two players. (Ball’ = Ball’’)</a:t>
+            </a:r>
+          </a:p>
+          <a:p>
+            <a:pPr marL="742950" indent="-742950">
+              <a:buAutoNum type="arabicPeriod"/>
+            </a:pPr>
+            <a:r>
+              <a:rPr lang="en-AU" sz="3200" dirty="0"/>
+              <a:t>If Ball’ is taken, its status becomes False. When a ball is picked with a False status, it is discarded and the next ball is taken instead. Hence, it is impossible to pick Ball’’.</a:t>
+            </a:r>
+          </a:p>
+          <a:p>
+            <a:pPr marL="742950" indent="-742950">
+              <a:buAutoNum type="arabicPeriod"/>
+            </a:pPr>
+            <a:r>
+              <a:rPr lang="en-AU" sz="3200" dirty="0"/>
+              <a:t>Hence, this is a contradiction and the same ball cannot be picked by two players.</a:t>
+            </a:r>
+          </a:p>
+          <a:p>
+            <a:pPr marL="742950" indent="-742950">
+              <a:buAutoNum type="arabicPeriod"/>
+            </a:pPr>
+            <a:endParaRPr lang="en-AU" sz="3600" dirty="0"/>
+          </a:p>
+          <a:p>
+            <a:pPr marL="742950" indent="-742950">
+              <a:buAutoNum type="arabicPeriod"/>
+            </a:pPr>
+            <a:endParaRPr lang="en-AU" sz="3600" dirty="0"/>
           </a:p>
         </p:txBody>
       </p:sp>
@@ -6789,7 +6986,11 @@
             </a:pPr>
             <a:r>
               <a:rPr lang="en-AU" sz="3600" dirty="0"/>
-              <a:t>In-Place? YES</a:t>
+              <a:t>In-Place? </a:t>
+            </a:r>
+            <a:r>
+              <a:rPr lang="en-AU" sz="3600" b="1" dirty="0"/>
+              <a:t>Yes</a:t>
             </a:r>
           </a:p>
           <a:p>
@@ -6930,7 +7131,11 @@
             </a:pPr>
             <a:r>
               <a:rPr lang="en-AU" sz="3600" dirty="0"/>
-              <a:t>Stable? NO</a:t>
+              <a:t>Stable? </a:t>
+            </a:r>
+            <a:r>
+              <a:rPr lang="en-AU" sz="3600" b="1" dirty="0"/>
+              <a:t>No</a:t>
             </a:r>
           </a:p>
           <a:p>

</xml_diff>